<commit_message>
corrected version of the howto
</commit_message>
<xml_diff>
--- a/FW Build Prozess Espressobin Board und Zertifikatserstellung.pptx
+++ b/FW Build Prozess Espressobin Board und Zertifikatserstellung.pptx
@@ -59,20 +59,20 @@
   <p:notesSz cx="6797675" cy="9928225"/>
   <p:embeddedFontLst>
     <p:embeddedFont>
-      <p:font typeface="Akkurat Light" panose="020B0604020202020204" charset="0"/>
+      <p:font typeface="Helvetica" panose="020B0604020202020204" pitchFamily="34" charset="0"/>
       <p:regular r:id="rId47"/>
+      <p:bold r:id="rId48"/>
+      <p:italic r:id="rId49"/>
+      <p:boldItalic r:id="rId50"/>
     </p:embeddedFont>
     <p:embeddedFont>
       <p:font typeface="Akkurat" panose="02000503030000020004" charset="0"/>
-      <p:regular r:id="rId48"/>
-      <p:bold r:id="rId49"/>
+      <p:regular r:id="rId51"/>
+      <p:bold r:id="rId52"/>
     </p:embeddedFont>
     <p:embeddedFont>
-      <p:font typeface="Helvetica" panose="020B0604020202020204" pitchFamily="34" charset="0"/>
-      <p:regular r:id="rId50"/>
-      <p:bold r:id="rId51"/>
-      <p:italic r:id="rId52"/>
-      <p:boldItalic r:id="rId53"/>
+      <p:font typeface="Akkurat Light" panose="020B0604020202020204" charset="0"/>
+      <p:regular r:id="rId53"/>
     </p:embeddedFont>
   </p:embeddedFontLst>
   <p:defaultTextStyle>
@@ -202,7 +202,7 @@
   </p:defaultTextStyle>
   <p:extLst>
     <p:ext uri="{EFAFB233-063F-42B5-8137-9DF3F51BA10A}">
-      <p15:sldGuideLst xmlns="" xmlns:p15="http://schemas.microsoft.com/office/powerpoint/2012/main">
+      <p15:sldGuideLst xmlns:p15="http://schemas.microsoft.com/office/powerpoint/2012/main" xmlns="">
         <p15:guide id="1" orient="horz" pos="2296" userDrawn="1">
           <p15:clr>
             <a:srgbClr val="A4A3A4"/>
@@ -256,7 +256,7 @@
       </p15:sldGuideLst>
     </p:ext>
     <p:ext uri="{2D200454-40CA-4A62-9FC3-DE9A4176ACB9}">
-      <p15:notesGuideLst xmlns="" xmlns:p15="http://schemas.microsoft.com/office/powerpoint/2012/main">
+      <p15:notesGuideLst xmlns:p15="http://schemas.microsoft.com/office/powerpoint/2012/main" xmlns="">
         <p15:guide id="1" orient="horz" pos="3127">
           <p15:clr>
             <a:srgbClr val="A4A3A4"/>
@@ -1741,7 +1741,7 @@
           <a:p>
             <a:fld id="{C1264E14-B290-48C6-89C3-42225994DF4E}" type="datetime1">
               <a:rPr lang="de-DE" smtClean="0"/>
-              <a:t>24.10.2018</a:t>
+              <a:t>25.10.2018</a:t>
             </a:fld>
             <a:endParaRPr lang="de-DE"/>
           </a:p>
@@ -2277,7 +2277,7 @@
           <a:p>
             <a:fld id="{4151FF44-2B8B-4340-BA7B-C43464B0EC59}" type="datetime1">
               <a:rPr lang="de-DE" smtClean="0"/>
-              <a:t>24.10.2018</a:t>
+              <a:t>25.10.2018</a:t>
             </a:fld>
             <a:endParaRPr lang="de-DE"/>
           </a:p>
@@ -2676,7 +2676,7 @@
           <a:p>
             <a:fld id="{BCFB55CF-3C7B-4008-9BA4-2489B1572505}" type="datetime1">
               <a:rPr lang="de-DE" smtClean="0"/>
-              <a:t>24.10.2018</a:t>
+              <a:t>25.10.2018</a:t>
             </a:fld>
             <a:endParaRPr lang="de-DE"/>
           </a:p>
@@ -3205,7 +3205,7 @@
           <a:p>
             <a:fld id="{457BC913-33EF-4EB6-9C0C-B9D68EECDDE2}" type="datetime1">
               <a:rPr lang="de-DE" smtClean="0"/>
-              <a:t>24.10.2018</a:t>
+              <a:t>25.10.2018</a:t>
             </a:fld>
             <a:endParaRPr lang="de-DE"/>
           </a:p>
@@ -3597,7 +3597,7 @@
           <a:p>
             <a:fld id="{447408AA-6A8E-4691-8C73-ED23C1068809}" type="datetime1">
               <a:rPr lang="de-DE" smtClean="0"/>
-              <a:t>24.10.2018</a:t>
+              <a:t>25.10.2018</a:t>
             </a:fld>
             <a:endParaRPr lang="de-DE"/>
           </a:p>
@@ -4133,7 +4133,7 @@
           <a:p>
             <a:fld id="{DA6DD66A-E87C-46C1-93FA-2D3C2BF120B9}" type="datetime1">
               <a:rPr lang="de-DE" smtClean="0"/>
-              <a:t>24.10.2018</a:t>
+              <a:t>25.10.2018</a:t>
             </a:fld>
             <a:endParaRPr lang="de-DE"/>
           </a:p>
@@ -4292,7 +4292,7 @@
           <a:p>
             <a:fld id="{80AFBF96-A351-47D3-BF56-010DB3B9D801}" type="datetime1">
               <a:rPr lang="de-DE" smtClean="0"/>
-              <a:t>24.10.2018</a:t>
+              <a:t>25.10.2018</a:t>
             </a:fld>
             <a:endParaRPr lang="de-DE"/>
           </a:p>
@@ -4588,7 +4588,7 @@
           <a:p>
             <a:fld id="{5A85AD8F-48FB-453C-B373-B49E3887F21F}" type="datetime1">
               <a:rPr lang="de-DE" smtClean="0"/>
-              <a:t>24.10.2018</a:t>
+              <a:t>25.10.2018</a:t>
             </a:fld>
             <a:endParaRPr lang="de-DE"/>
           </a:p>
@@ -4882,7 +4882,7 @@
           <a:p>
             <a:fld id="{F7A85D53-B6BB-4040-B279-54EE191FE360}" type="datetime1">
               <a:rPr lang="de-DE" smtClean="0"/>
-              <a:t>24.10.2018</a:t>
+              <a:t>25.10.2018</a:t>
             </a:fld>
             <a:endParaRPr lang="de-DE"/>
           </a:p>
@@ -5176,7 +5176,7 @@
           <a:p>
             <a:fld id="{DD3A5D0E-CD1F-43B6-8FC8-A9C4F59E9F6E}" type="datetime1">
               <a:rPr lang="de-DE" smtClean="0"/>
-              <a:t>24.10.2018</a:t>
+              <a:t>25.10.2018</a:t>
             </a:fld>
             <a:endParaRPr lang="de-DE"/>
           </a:p>
@@ -6906,7 +6906,7 @@
           <a:p>
             <a:fld id="{A60F47CF-8812-42B2-B647-EF7375698385}" type="datetime1">
               <a:rPr lang="de-DE" smtClean="0"/>
-              <a:t>24.10.2018</a:t>
+              <a:t>25.10.2018</a:t>
             </a:fld>
             <a:endParaRPr lang="de-DE"/>
           </a:p>
@@ -7442,7 +7442,7 @@
           <a:p>
             <a:fld id="{05E6C48D-7B36-4DFD-95CA-B6C8033530CF}" type="datetime1">
               <a:rPr lang="de-DE" smtClean="0"/>
-              <a:t>24.10.2018</a:t>
+              <a:t>25.10.2018</a:t>
             </a:fld>
             <a:endParaRPr lang="de-DE"/>
           </a:p>
@@ -7834,7 +7834,7 @@
           <a:p>
             <a:fld id="{598ABA28-B2A8-442C-81E3-B6BD768E95DE}" type="datetime1">
               <a:rPr lang="de-DE" smtClean="0"/>
-              <a:t>24.10.2018</a:t>
+              <a:t>25.10.2018</a:t>
             </a:fld>
             <a:endParaRPr lang="de-DE"/>
           </a:p>
@@ -8370,7 +8370,7 @@
           <a:p>
             <a:fld id="{F7A92B78-969E-4DD2-BBD0-99DA7E4F67FA}" type="datetime1">
               <a:rPr lang="de-DE" smtClean="0"/>
-              <a:t>24.10.2018</a:t>
+              <a:t>25.10.2018</a:t>
             </a:fld>
             <a:endParaRPr lang="de-DE"/>
           </a:p>
@@ -9029,7 +9029,7 @@
           <a:p>
             <a:fld id="{C219B7A7-8F7F-4737-82FD-6E69E9B54C56}" type="datetime1">
               <a:rPr lang="de-DE" smtClean="0"/>
-              <a:t>24.10.2018</a:t>
+              <a:t>25.10.2018</a:t>
             </a:fld>
             <a:endParaRPr lang="de-DE"/>
           </a:p>
@@ -9549,7 +9549,7 @@
           <a:p>
             <a:fld id="{736CE57F-4FAD-4E5B-8523-7406BBAB9551}" type="datetime1">
               <a:rPr lang="de-DE" smtClean="0"/>
-              <a:t>24.10.2018</a:t>
+              <a:t>25.10.2018</a:t>
             </a:fld>
             <a:endParaRPr lang="de-DE"/>
           </a:p>
@@ -10709,7 +10709,7 @@
           <a:p>
             <a:fld id="{A60F47CF-8812-42B2-B647-EF7375698385}" type="datetime1">
               <a:rPr lang="de-DE" smtClean="0"/>
-              <a:t>24.10.2018</a:t>
+              <a:t>25.10.2018</a:t>
             </a:fld>
             <a:endParaRPr lang="de-DE"/>
           </a:p>
@@ -11016,7 +11016,7 @@
           <a:p>
             <a:fld id="{A60F47CF-8812-42B2-B647-EF7375698385}" type="datetime1">
               <a:rPr lang="de-DE" smtClean="0"/>
-              <a:t>24.10.2018</a:t>
+              <a:t>25.10.2018</a:t>
             </a:fld>
             <a:endParaRPr lang="de-DE"/>
           </a:p>
@@ -11612,7 +11612,7 @@
           <a:p>
             <a:fld id="{A60F47CF-8812-42B2-B647-EF7375698385}" type="datetime1">
               <a:rPr lang="de-DE" smtClean="0"/>
-              <a:t>24.10.2018</a:t>
+              <a:t>25.10.2018</a:t>
             </a:fld>
             <a:endParaRPr lang="de-DE"/>
           </a:p>
@@ -12068,7 +12068,7 @@
           <a:p>
             <a:fld id="{A60F47CF-8812-42B2-B647-EF7375698385}" type="datetime1">
               <a:rPr lang="de-DE" smtClean="0"/>
-              <a:t>24.10.2018</a:t>
+              <a:t>25.10.2018</a:t>
             </a:fld>
             <a:endParaRPr lang="de-DE"/>
           </a:p>
@@ -12281,7 +12281,7 @@
           <a:p>
             <a:fld id="{A60F47CF-8812-42B2-B647-EF7375698385}" type="datetime1">
               <a:rPr lang="de-DE" smtClean="0"/>
-              <a:t>24.10.2018</a:t>
+              <a:t>25.10.2018</a:t>
             </a:fld>
             <a:endParaRPr lang="de-DE"/>
           </a:p>
@@ -12592,7 +12592,7 @@
           <a:p>
             <a:fld id="{A60F47CF-8812-42B2-B647-EF7375698385}" type="datetime1">
               <a:rPr lang="de-DE" smtClean="0"/>
-              <a:t>24.10.2018</a:t>
+              <a:t>25.10.2018</a:t>
             </a:fld>
             <a:endParaRPr lang="de-DE"/>
           </a:p>
@@ -12946,7 +12946,7 @@
           <a:p>
             <a:fld id="{A60F47CF-8812-42B2-B647-EF7375698385}" type="datetime1">
               <a:rPr lang="de-DE" smtClean="0"/>
-              <a:t>24.10.2018</a:t>
+              <a:t>25.10.2018</a:t>
             </a:fld>
             <a:endParaRPr lang="de-DE" dirty="0"/>
           </a:p>
@@ -13888,7 +13888,7 @@
           <a:p>
             <a:fld id="{A60F47CF-8812-42B2-B647-EF7375698385}" type="datetime1">
               <a:rPr lang="de-DE" smtClean="0"/>
-              <a:t>24.10.2018</a:t>
+              <a:t>25.10.2018</a:t>
             </a:fld>
             <a:endParaRPr lang="de-DE"/>
           </a:p>
@@ -14330,7 +14330,7 @@
           <a:p>
             <a:fld id="{A60F47CF-8812-42B2-B647-EF7375698385}" type="datetime1">
               <a:rPr lang="de-DE" smtClean="0"/>
-              <a:t>24.10.2018</a:t>
+              <a:t>25.10.2018</a:t>
             </a:fld>
             <a:endParaRPr lang="de-DE"/>
           </a:p>
@@ -14694,7 +14694,7 @@
           <a:p>
             <a:fld id="{A60F47CF-8812-42B2-B647-EF7375698385}" type="datetime1">
               <a:rPr lang="de-DE" smtClean="0"/>
-              <a:t>24.10.2018</a:t>
+              <a:t>25.10.2018</a:t>
             </a:fld>
             <a:endParaRPr lang="de-DE"/>
           </a:p>
@@ -15131,7 +15131,7 @@
           <a:p>
             <a:fld id="{39CA9E1E-548A-4E91-87C0-B2D38FEDEB89}" type="datetime1">
               <a:rPr lang="de-DE" smtClean="0"/>
-              <a:t>24.10.2018</a:t>
+              <a:t>25.10.2018</a:t>
             </a:fld>
             <a:endParaRPr lang="de-DE"/>
           </a:p>
@@ -15677,7 +15677,7 @@
           <a:p>
             <a:fld id="{A60F47CF-8812-42B2-B647-EF7375698385}" type="datetime1">
               <a:rPr lang="de-DE" smtClean="0"/>
-              <a:t>24.10.2018</a:t>
+              <a:t>25.10.2018</a:t>
             </a:fld>
             <a:endParaRPr lang="de-DE"/>
           </a:p>
@@ -16138,7 +16138,7 @@
           <a:p>
             <a:fld id="{A60F47CF-8812-42B2-B647-EF7375698385}" type="datetime1">
               <a:rPr lang="de-DE" smtClean="0"/>
-              <a:t>24.10.2018</a:t>
+              <a:t>25.10.2018</a:t>
             </a:fld>
             <a:endParaRPr lang="de-DE"/>
           </a:p>
@@ -16360,7 +16360,7 @@
           <a:p>
             <a:fld id="{A60F47CF-8812-42B2-B647-EF7375698385}" type="datetime1">
               <a:rPr lang="de-DE" smtClean="0"/>
-              <a:t>24.10.2018</a:t>
+              <a:t>25.10.2018</a:t>
             </a:fld>
             <a:endParaRPr lang="de-DE"/>
           </a:p>
@@ -16655,7 +16655,7 @@
           <a:p>
             <a:fld id="{A60F47CF-8812-42B2-B647-EF7375698385}" type="datetime1">
               <a:rPr lang="de-DE" smtClean="0"/>
-              <a:t>24.10.2018</a:t>
+              <a:t>25.10.2018</a:t>
             </a:fld>
             <a:endParaRPr lang="de-DE"/>
           </a:p>
@@ -16881,7 +16881,7 @@
           <a:p>
             <a:fld id="{A60F47CF-8812-42B2-B647-EF7375698385}" type="datetime1">
               <a:rPr lang="de-DE" smtClean="0"/>
-              <a:t>24.10.2018</a:t>
+              <a:t>25.10.2018</a:t>
             </a:fld>
             <a:endParaRPr lang="de-DE"/>
           </a:p>
@@ -17156,7 +17156,7 @@
           <a:p>
             <a:fld id="{A60F47CF-8812-42B2-B647-EF7375698385}" type="datetime1">
               <a:rPr lang="de-DE" smtClean="0"/>
-              <a:t>24.10.2018</a:t>
+              <a:t>25.10.2018</a:t>
             </a:fld>
             <a:endParaRPr lang="de-DE"/>
           </a:p>
@@ -17519,7 +17519,7 @@
           <a:p>
             <a:fld id="{A60F47CF-8812-42B2-B647-EF7375698385}" type="datetime1">
               <a:rPr lang="de-DE" smtClean="0"/>
-              <a:t>24.10.2018</a:t>
+              <a:t>25.10.2018</a:t>
             </a:fld>
             <a:endParaRPr lang="de-DE"/>
           </a:p>
@@ -17941,7 +17941,7 @@
           <a:p>
             <a:fld id="{A60F47CF-8812-42B2-B647-EF7375698385}" type="datetime1">
               <a:rPr lang="de-DE" smtClean="0"/>
-              <a:t>24.10.2018</a:t>
+              <a:t>25.10.2018</a:t>
             </a:fld>
             <a:endParaRPr lang="de-DE"/>
           </a:p>
@@ -18219,7 +18219,7 @@
           <a:p>
             <a:fld id="{A60F47CF-8812-42B2-B647-EF7375698385}" type="datetime1">
               <a:rPr lang="de-DE" smtClean="0"/>
-              <a:t>24.10.2018</a:t>
+              <a:t>25.10.2018</a:t>
             </a:fld>
             <a:endParaRPr lang="de-DE"/>
           </a:p>
@@ -18579,7 +18579,7 @@
           <a:p>
             <a:fld id="{A60F47CF-8812-42B2-B647-EF7375698385}" type="datetime1">
               <a:rPr lang="de-DE" smtClean="0"/>
-              <a:t>24.10.2018</a:t>
+              <a:t>25.10.2018</a:t>
             </a:fld>
             <a:endParaRPr lang="de-DE"/>
           </a:p>
@@ -18838,7 +18838,7 @@
           <a:p>
             <a:fld id="{A60F47CF-8812-42B2-B647-EF7375698385}" type="datetime1">
               <a:rPr lang="de-DE" smtClean="0"/>
-              <a:t>24.10.2018</a:t>
+              <a:t>25.10.2018</a:t>
             </a:fld>
             <a:endParaRPr lang="de-DE"/>
           </a:p>
@@ -19146,7 +19146,7 @@
           <a:p>
             <a:fld id="{A60F47CF-8812-42B2-B647-EF7375698385}" type="datetime1">
               <a:rPr lang="de-DE" smtClean="0"/>
-              <a:t>24.10.2018</a:t>
+              <a:t>25.10.2018</a:t>
             </a:fld>
             <a:endParaRPr lang="de-DE"/>
           </a:p>
@@ -19427,7 +19427,7 @@
           <a:p>
             <a:fld id="{A60F47CF-8812-42B2-B647-EF7375698385}" type="datetime1">
               <a:rPr lang="de-DE" smtClean="0"/>
-              <a:t>24.10.2018</a:t>
+              <a:t>25.10.2018</a:t>
             </a:fld>
             <a:endParaRPr lang="de-DE"/>
           </a:p>
@@ -19880,7 +19880,7 @@
           <a:p>
             <a:fld id="{A60F47CF-8812-42B2-B647-EF7375698385}" type="datetime1">
               <a:rPr lang="de-DE" smtClean="0"/>
-              <a:t>24.10.2018</a:t>
+              <a:t>25.10.2018</a:t>
             </a:fld>
             <a:endParaRPr lang="de-DE"/>
           </a:p>
@@ -20144,7 +20144,7 @@
           <a:p>
             <a:fld id="{A60F47CF-8812-42B2-B647-EF7375698385}" type="datetime1">
               <a:rPr lang="de-DE" smtClean="0"/>
-              <a:t>24.10.2018</a:t>
+              <a:t>25.10.2018</a:t>
             </a:fld>
             <a:endParaRPr lang="de-DE"/>
           </a:p>
@@ -20445,7 +20445,7 @@
           <a:p>
             <a:fld id="{A60F47CF-8812-42B2-B647-EF7375698385}" type="datetime1">
               <a:rPr lang="de-DE" smtClean="0"/>
-              <a:t>24.10.2018</a:t>
+              <a:t>25.10.2018</a:t>
             </a:fld>
             <a:endParaRPr lang="de-DE"/>
           </a:p>
@@ -20733,7 +20733,7 @@
           <a:p>
             <a:fld id="{A60F47CF-8812-42B2-B647-EF7375698385}" type="datetime1">
               <a:rPr lang="de-DE" smtClean="0"/>
-              <a:t>24.10.2018</a:t>
+              <a:t>25.10.2018</a:t>
             </a:fld>
             <a:endParaRPr lang="de-DE"/>
           </a:p>
@@ -21054,7 +21054,7 @@
           <a:p>
             <a:fld id="{A60F47CF-8812-42B2-B647-EF7375698385}" type="datetime1">
               <a:rPr lang="de-DE" smtClean="0"/>
-              <a:t>24.10.2018</a:t>
+              <a:t>25.10.2018</a:t>
             </a:fld>
             <a:endParaRPr lang="de-DE"/>
           </a:p>
@@ -21325,7 +21325,7 @@
           <a:p>
             <a:fld id="{A60F47CF-8812-42B2-B647-EF7375698385}" type="datetime1">
               <a:rPr lang="de-DE" smtClean="0"/>
-              <a:t>24.10.2018</a:t>
+              <a:t>25.10.2018</a:t>
             </a:fld>
             <a:endParaRPr lang="de-DE"/>
           </a:p>
@@ -21881,7 +21881,7 @@
           <a:p>
             <a:fld id="{A60F47CF-8812-42B2-B647-EF7375698385}" type="datetime1">
               <a:rPr lang="de-DE" smtClean="0"/>
-              <a:t>24.10.2018</a:t>
+              <a:t>25.10.2018</a:t>
             </a:fld>
             <a:endParaRPr lang="de-DE"/>
           </a:p>
@@ -22579,7 +22579,7 @@
           <a:p>
             <a:fld id="{A60F47CF-8812-42B2-B647-EF7375698385}" type="datetime1">
               <a:rPr lang="de-DE" smtClean="0"/>
-              <a:t>24.10.2018</a:t>
+              <a:t>25.10.2018</a:t>
             </a:fld>
             <a:endParaRPr lang="de-DE"/>
           </a:p>
@@ -22879,7 +22879,7 @@
           <a:p>
             <a:fld id="{A60F47CF-8812-42B2-B647-EF7375698385}" type="datetime1">
               <a:rPr lang="de-DE" smtClean="0"/>
-              <a:t>24.10.2018</a:t>
+              <a:t>25.10.2018</a:t>
             </a:fld>
             <a:endParaRPr lang="de-DE"/>
           </a:p>
@@ -23223,7 +23223,7 @@
           <a:p>
             <a:fld id="{A60F47CF-8812-42B2-B647-EF7375698385}" type="datetime1">
               <a:rPr lang="de-DE" smtClean="0"/>
-              <a:t>24.10.2018</a:t>
+              <a:t>25.10.2018</a:t>
             </a:fld>
             <a:endParaRPr lang="de-DE"/>
           </a:p>
@@ -23882,13 +23882,7 @@
               <a:rPr lang="de-DE" smtClean="0">
                 <a:hlinkClick r:id="rId2"/>
               </a:rPr>
-              <a:t>://</a:t>
-            </a:r>
-            <a:r>
-              <a:rPr lang="de-DE" smtClean="0">
-                <a:hlinkClick r:id="rId2"/>
-              </a:rPr>
-              <a:t>github.com/saerdnaepap/openwrt-dd.git </a:t>
+              <a:t>://github.com/saerdnaepap/openwrt-dd.git </a:t>
             </a:r>
             <a:r>
               <a:rPr lang="de-DE" dirty="0" smtClean="0">
@@ -24044,7 +24038,7 @@
           <a:p>
             <a:fld id="{05E6C48D-7B36-4DFD-95CA-B6C8033530CF}" type="datetime1">
               <a:rPr lang="de-DE" smtClean="0"/>
-              <a:t>24.10.2018</a:t>
+              <a:t>25.10.2018</a:t>
             </a:fld>
             <a:endParaRPr lang="de-DE"/>
           </a:p>
@@ -24373,7 +24367,37 @@
               <a:rPr lang="de-DE" dirty="0" smtClean="0">
                 <a:sym typeface="Wingdings" panose="05000000000000000000" pitchFamily="2" charset="2"/>
               </a:rPr>
-              <a:t>auf das Verzeichnis ~/</a:t>
+              <a:t>auf das Verzeichnis </a:t>
+            </a:r>
+            <a:r>
+              <a:rPr lang="de-DE" dirty="0" smtClean="0">
+                <a:sym typeface="Wingdings" panose="05000000000000000000" pitchFamily="2" charset="2"/>
+              </a:rPr>
+              <a:t>/</a:t>
+            </a:r>
+            <a:r>
+              <a:rPr lang="de-DE" dirty="0" err="1" smtClean="0">
+                <a:sym typeface="Wingdings" panose="05000000000000000000" pitchFamily="2" charset="2"/>
+              </a:rPr>
+              <a:t>home</a:t>
+            </a:r>
+            <a:r>
+              <a:rPr lang="de-DE" dirty="0" smtClean="0">
+                <a:sym typeface="Wingdings" panose="05000000000000000000" pitchFamily="2" charset="2"/>
+              </a:rPr>
+              <a:t>/&lt;</a:t>
+            </a:r>
+            <a:r>
+              <a:rPr lang="de-DE" dirty="0" err="1" smtClean="0">
+                <a:sym typeface="Wingdings" panose="05000000000000000000" pitchFamily="2" charset="2"/>
+              </a:rPr>
+              <a:t>user</a:t>
+            </a:r>
+            <a:r>
+              <a:rPr lang="de-DE" smtClean="0">
+                <a:sym typeface="Wingdings" panose="05000000000000000000" pitchFamily="2" charset="2"/>
+              </a:rPr>
+              <a:t>&gt;/</a:t>
             </a:r>
             <a:r>
               <a:rPr lang="de-DE" dirty="0" err="1" smtClean="0">
@@ -24409,7 +24433,13 @@
               <a:rPr lang="de-DE" dirty="0" smtClean="0">
                 <a:sym typeface="Wingdings" panose="05000000000000000000" pitchFamily="2" charset="2"/>
               </a:rPr>
-              <a:t> geändert werden.</a:t>
+              <a:t> </a:t>
+            </a:r>
+            <a:r>
+              <a:rPr lang="de-DE" dirty="0" smtClean="0">
+                <a:sym typeface="Wingdings" panose="05000000000000000000" pitchFamily="2" charset="2"/>
+              </a:rPr>
+              <a:t>geändert werden.</a:t>
             </a:r>
           </a:p>
           <a:p>
@@ -24541,7 +24571,7 @@
           <a:p>
             <a:fld id="{A60F47CF-8812-42B2-B647-EF7375698385}" type="datetime1">
               <a:rPr lang="de-DE" smtClean="0"/>
-              <a:t>24.10.2018</a:t>
+              <a:t>25.10.2018</a:t>
             </a:fld>
             <a:endParaRPr lang="de-DE"/>
           </a:p>
@@ -24835,7 +24865,7 @@
           <a:p>
             <a:fld id="{A60F47CF-8812-42B2-B647-EF7375698385}" type="datetime1">
               <a:rPr lang="de-DE" smtClean="0"/>
-              <a:t>24.10.2018</a:t>
+              <a:t>25.10.2018</a:t>
             </a:fld>
             <a:endParaRPr lang="de-DE"/>
           </a:p>
@@ -25178,7 +25208,7 @@
           <a:p>
             <a:fld id="{A60F47CF-8812-42B2-B647-EF7375698385}" type="datetime1">
               <a:rPr lang="de-DE" smtClean="0"/>
-              <a:t>24.10.2018</a:t>
+              <a:t>25.10.2018</a:t>
             </a:fld>
             <a:endParaRPr lang="de-DE"/>
           </a:p>
@@ -25474,7 +25504,7 @@
           <a:p>
             <a:fld id="{A60F47CF-8812-42B2-B647-EF7375698385}" type="datetime1">
               <a:rPr lang="de-DE" smtClean="0"/>
-              <a:t>24.10.2018</a:t>
+              <a:t>25.10.2018</a:t>
             </a:fld>
             <a:endParaRPr lang="de-DE"/>
           </a:p>
@@ -26182,7 +26212,7 @@
   </a:extraClrSchemeLst>
   <a:extLst>
     <a:ext uri="{05A4C25C-085E-4340-85A3-A5531E510DB2}">
-      <thm15:themeFamily xmlns="" xmlns:thm15="http://schemas.microsoft.com/office/thememl/2012/main" name="Präsentation1" id="{048F39AA-0669-4CCB-AA14-4D550389F6CC}" vid="{E837218A-9489-48E1-BFAE-6AAF6D3BA78C}"/>
+      <thm15:themeFamily xmlns:thm15="http://schemas.microsoft.com/office/thememl/2012/main" xmlns="" name="Präsentation1" id="{048F39AA-0669-4CCB-AA14-4D550389F6CC}" vid="{E837218A-9489-48E1-BFAE-6AAF6D3BA78C}"/>
     </a:ext>
   </a:extLst>
 </a:theme>
@@ -26412,7 +26442,7 @@
   <a:extraClrSchemeLst/>
   <a:extLst>
     <a:ext uri="{05A4C25C-085E-4340-85A3-A5531E510DB2}">
-      <thm15:themeFamily xmlns="" xmlns:thm15="http://schemas.microsoft.com/office/thememl/2012/main" name="Präsentation1" id="{048F39AA-0669-4CCB-AA14-4D550389F6CC}" vid="{975303DC-F9CE-4059-B2E1-2555D0E9D233}"/>
+      <thm15:themeFamily xmlns:thm15="http://schemas.microsoft.com/office/thememl/2012/main" xmlns="" name="Präsentation1" id="{048F39AA-0669-4CCB-AA14-4D550389F6CC}" vid="{975303DC-F9CE-4059-B2E1-2555D0E9D233}"/>
     </a:ext>
   </a:extLst>
 </a:theme>
@@ -26700,7 +26730,7 @@
   <a:extraClrSchemeLst/>
   <a:extLst>
     <a:ext uri="{05A4C25C-085E-4340-85A3-A5531E510DB2}">
-      <thm15:themeFamily xmlns="" xmlns:thm15="http://schemas.microsoft.com/office/thememl/2012/main" name="Präsentation1" id="{048F39AA-0669-4CCB-AA14-4D550389F6CC}" vid="{CE18303E-611C-4EEA-AB04-DCE59975DFA8}"/>
+      <thm15:themeFamily xmlns:thm15="http://schemas.microsoft.com/office/thememl/2012/main" xmlns="" name="Präsentation1" id="{048F39AA-0669-4CCB-AA14-4D550389F6CC}" vid="{CE18303E-611C-4EEA-AB04-DCE59975DFA8}"/>
     </a:ext>
   </a:extLst>
 </a:theme>

</xml_diff>